<commit_message>
Updated old logos again
</commit_message>
<xml_diff>
--- a/old/Landing.pptx
+++ b/old/Landing.pptx
@@ -6,9 +6,10 @@
   </p:sldMasterIdLst>
   <p:sldIdLst>
     <p:sldId id="313" r:id="rId2"/>
-    <p:sldId id="310" r:id="rId3"/>
-    <p:sldId id="312" r:id="rId4"/>
-    <p:sldId id="309" r:id="rId5"/>
+    <p:sldId id="314" r:id="rId3"/>
+    <p:sldId id="310" r:id="rId4"/>
+    <p:sldId id="312" r:id="rId5"/>
+    <p:sldId id="309" r:id="rId6"/>
   </p:sldIdLst>
   <p:sldSz cx="43200638" cy="18000663"/>
   <p:notesSz cx="9144000" cy="6858000"/>
@@ -246,7 +247,7 @@
           <a:p>
             <a:fld id="{F860720E-DA52-45D7-B057-C772CD509514}" type="datetimeFigureOut">
               <a:rPr lang="en-GB" smtClean="0"/>
-              <a:t>20/02/2015</a:t>
+              <a:t>01/03/2015</a:t>
             </a:fld>
             <a:endParaRPr lang="en-GB"/>
           </a:p>
@@ -416,7 +417,7 @@
           <a:p>
             <a:fld id="{F860720E-DA52-45D7-B057-C772CD509514}" type="datetimeFigureOut">
               <a:rPr lang="en-GB" smtClean="0"/>
-              <a:t>20/02/2015</a:t>
+              <a:t>01/03/2015</a:t>
             </a:fld>
             <a:endParaRPr lang="en-GB"/>
           </a:p>
@@ -596,7 +597,7 @@
           <a:p>
             <a:fld id="{F860720E-DA52-45D7-B057-C772CD509514}" type="datetimeFigureOut">
               <a:rPr lang="en-GB" smtClean="0"/>
-              <a:t>20/02/2015</a:t>
+              <a:t>01/03/2015</a:t>
             </a:fld>
             <a:endParaRPr lang="en-GB"/>
           </a:p>
@@ -766,7 +767,7 @@
           <a:p>
             <a:fld id="{F860720E-DA52-45D7-B057-C772CD509514}" type="datetimeFigureOut">
               <a:rPr lang="en-GB" smtClean="0"/>
-              <a:t>20/02/2015</a:t>
+              <a:t>01/03/2015</a:t>
             </a:fld>
             <a:endParaRPr lang="en-GB"/>
           </a:p>
@@ -1012,7 +1013,7 @@
           <a:p>
             <a:fld id="{F860720E-DA52-45D7-B057-C772CD509514}" type="datetimeFigureOut">
               <a:rPr lang="en-GB" smtClean="0"/>
-              <a:t>20/02/2015</a:t>
+              <a:t>01/03/2015</a:t>
             </a:fld>
             <a:endParaRPr lang="en-GB"/>
           </a:p>
@@ -1244,7 +1245,7 @@
           <a:p>
             <a:fld id="{F860720E-DA52-45D7-B057-C772CD509514}" type="datetimeFigureOut">
               <a:rPr lang="en-GB" smtClean="0"/>
-              <a:t>20/02/2015</a:t>
+              <a:t>01/03/2015</a:t>
             </a:fld>
             <a:endParaRPr lang="en-GB"/>
           </a:p>
@@ -1611,7 +1612,7 @@
           <a:p>
             <a:fld id="{F860720E-DA52-45D7-B057-C772CD509514}" type="datetimeFigureOut">
               <a:rPr lang="en-GB" smtClean="0"/>
-              <a:t>20/02/2015</a:t>
+              <a:t>01/03/2015</a:t>
             </a:fld>
             <a:endParaRPr lang="en-GB"/>
           </a:p>
@@ -1729,7 +1730,7 @@
           <a:p>
             <a:fld id="{F860720E-DA52-45D7-B057-C772CD509514}" type="datetimeFigureOut">
               <a:rPr lang="en-GB" smtClean="0"/>
-              <a:t>20/02/2015</a:t>
+              <a:t>01/03/2015</a:t>
             </a:fld>
             <a:endParaRPr lang="en-GB"/>
           </a:p>
@@ -1824,7 +1825,7 @@
           <a:p>
             <a:fld id="{F860720E-DA52-45D7-B057-C772CD509514}" type="datetimeFigureOut">
               <a:rPr lang="en-GB" smtClean="0"/>
-              <a:t>20/02/2015</a:t>
+              <a:t>01/03/2015</a:t>
             </a:fld>
             <a:endParaRPr lang="en-GB"/>
           </a:p>
@@ -2101,7 +2102,7 @@
           <a:p>
             <a:fld id="{F860720E-DA52-45D7-B057-C772CD509514}" type="datetimeFigureOut">
               <a:rPr lang="en-GB" smtClean="0"/>
-              <a:t>20/02/2015</a:t>
+              <a:t>01/03/2015</a:t>
             </a:fld>
             <a:endParaRPr lang="en-GB"/>
           </a:p>
@@ -2358,7 +2359,7 @@
           <a:p>
             <a:fld id="{F860720E-DA52-45D7-B057-C772CD509514}" type="datetimeFigureOut">
               <a:rPr lang="en-GB" smtClean="0"/>
-              <a:t>20/02/2015</a:t>
+              <a:t>01/03/2015</a:t>
             </a:fld>
             <a:endParaRPr lang="en-GB"/>
           </a:p>
@@ -2571,7 +2572,7 @@
           <a:p>
             <a:fld id="{F860720E-DA52-45D7-B057-C772CD509514}" type="datetimeFigureOut">
               <a:rPr lang="en-GB" smtClean="0"/>
-              <a:t>20/02/2015</a:t>
+              <a:t>01/03/2015</a:t>
             </a:fld>
             <a:endParaRPr lang="en-GB"/>
           </a:p>
@@ -3031,7 +3032,7 @@
                 </a:solidFill>
                 <a:latin typeface="Showcard Gothic" panose="04020904020102020604" pitchFamily="82" charset="0"/>
               </a:rPr>
-              <a:t>Config</a:t>
+              <a:t>Login</a:t>
             </a:r>
             <a:endParaRPr lang="en-GB" sz="30000" dirty="0">
               <a:solidFill>
@@ -3148,7 +3149,7 @@
           <a:lstStyle/>
           <a:p>
             <a:r>
-              <a:rPr lang="en-GB" sz="30000" dirty="0" err="1" smtClean="0">
+              <a:rPr lang="en-GB" sz="30000" dirty="0" err="1">
                 <a:solidFill>
                   <a:schemeClr val="bg1"/>
                 </a:solidFill>
@@ -3157,13 +3158,22 @@
               <a:t>StyleCI</a:t>
             </a:r>
             <a:r>
+              <a:rPr lang="en-GB" sz="30000" dirty="0">
+                <a:solidFill>
+                  <a:schemeClr val="bg1"/>
+                </a:solidFill>
+                <a:latin typeface="Showcard Gothic" panose="04020904020102020604" pitchFamily="82" charset="0"/>
+              </a:rPr>
+              <a:t> </a:t>
+            </a:r>
+            <a:r>
               <a:rPr lang="en-GB" sz="30000" dirty="0" smtClean="0">
                 <a:solidFill>
                   <a:schemeClr val="bg1"/>
                 </a:solidFill>
                 <a:latin typeface="Showcard Gothic" panose="04020904020102020604" pitchFamily="82" charset="0"/>
               </a:rPr>
-              <a:t> Git</a:t>
+              <a:t>Config</a:t>
             </a:r>
             <a:endParaRPr lang="en-GB" sz="30000" dirty="0">
               <a:solidFill>
@@ -3215,7 +3225,7 @@
     </p:spTree>
     <p:extLst>
       <p:ext uri="{BB962C8B-B14F-4D97-AF65-F5344CB8AC3E}">
-        <p14:creationId xmlns:p14="http://schemas.microsoft.com/office/powerpoint/2010/main" val="2683389994"/>
+        <p14:creationId xmlns:p14="http://schemas.microsoft.com/office/powerpoint/2010/main" val="940091410"/>
       </p:ext>
     </p:extLst>
   </p:cSld>
@@ -3280,6 +3290,138 @@
           <a:lstStyle/>
           <a:p>
             <a:r>
+              <a:rPr lang="en-GB" sz="30000" dirty="0" err="1" smtClean="0">
+                <a:solidFill>
+                  <a:schemeClr val="bg1"/>
+                </a:solidFill>
+                <a:latin typeface="Showcard Gothic" panose="04020904020102020604" pitchFamily="82" charset="0"/>
+              </a:rPr>
+              <a:t>StyleCI</a:t>
+            </a:r>
+            <a:r>
+              <a:rPr lang="en-GB" sz="30000" dirty="0" smtClean="0">
+                <a:solidFill>
+                  <a:schemeClr val="bg1"/>
+                </a:solidFill>
+                <a:latin typeface="Showcard Gothic" panose="04020904020102020604" pitchFamily="82" charset="0"/>
+              </a:rPr>
+              <a:t> Git</a:t>
+            </a:r>
+            <a:endParaRPr lang="en-GB" sz="30000" dirty="0">
+              <a:solidFill>
+                <a:schemeClr val="bg1"/>
+              </a:solidFill>
+              <a:latin typeface="Showcard Gothic" panose="04020904020102020604" pitchFamily="82" charset="0"/>
+            </a:endParaRPr>
+          </a:p>
+        </p:txBody>
+      </p:sp>
+      <p:sp>
+        <p:nvSpPr>
+          <p:cNvPr id="5" name="Subtitle 4"/>
+          <p:cNvSpPr>
+            <a:spLocks noGrp="1"/>
+          </p:cNvSpPr>
+          <p:nvPr>
+            <p:ph type="subTitle" idx="1"/>
+          </p:nvPr>
+        </p:nvSpPr>
+        <p:spPr>
+          <a:xfrm>
+            <a:off x="8100319" y="9900000"/>
+            <a:ext cx="27000000" cy="3996000"/>
+          </a:xfrm>
+        </p:spPr>
+        <p:txBody>
+          <a:bodyPr>
+            <a:normAutofit/>
+          </a:bodyPr>
+          <a:lstStyle/>
+          <a:p>
+            <a:r>
+              <a:rPr lang="en-GB" sz="18000" b="1" dirty="0" smtClean="0">
+                <a:solidFill>
+                  <a:schemeClr val="bg1"/>
+                </a:solidFill>
+              </a:rPr>
+              <a:t>By Graham Campbell</a:t>
+            </a:r>
+            <a:endParaRPr lang="en-GB" sz="18000" b="1" dirty="0">
+              <a:solidFill>
+                <a:schemeClr val="bg1"/>
+              </a:solidFill>
+            </a:endParaRPr>
+          </a:p>
+        </p:txBody>
+      </p:sp>
+    </p:spTree>
+    <p:extLst>
+      <p:ext uri="{BB962C8B-B14F-4D97-AF65-F5344CB8AC3E}">
+        <p14:creationId xmlns:p14="http://schemas.microsoft.com/office/powerpoint/2010/main" val="2683389994"/>
+      </p:ext>
+    </p:extLst>
+  </p:cSld>
+  <p:clrMapOvr>
+    <a:masterClrMapping/>
+  </p:clrMapOvr>
+  <p:timing>
+    <p:tnLst>
+      <p:par>
+        <p:cTn id="1" dur="indefinite" restart="never" nodeType="tmRoot"/>
+      </p:par>
+    </p:tnLst>
+  </p:timing>
+</p:sld>
+</file>
+
+<file path=ppt/slides/slide4.xml><?xml version="1.0" encoding="utf-8"?>
+<p:sld xmlns:a="http://schemas.openxmlformats.org/drawingml/2006/main" xmlns:r="http://schemas.openxmlformats.org/officeDocument/2006/relationships" xmlns:p="http://schemas.openxmlformats.org/presentationml/2006/main">
+  <p:cSld>
+    <p:bg>
+      <p:bgPr>
+        <a:solidFill>
+          <a:srgbClr val="FA503A"/>
+        </a:solidFill>
+        <a:effectLst/>
+      </p:bgPr>
+    </p:bg>
+    <p:spTree>
+      <p:nvGrpSpPr>
+        <p:cNvPr id="1" name=""/>
+        <p:cNvGrpSpPr/>
+        <p:nvPr/>
+      </p:nvGrpSpPr>
+      <p:grpSpPr>
+        <a:xfrm>
+          <a:off x="0" y="0"/>
+          <a:ext cx="0" cy="0"/>
+          <a:chOff x="0" y="0"/>
+          <a:chExt cx="0" cy="0"/>
+        </a:xfrm>
+      </p:grpSpPr>
+      <p:sp>
+        <p:nvSpPr>
+          <p:cNvPr id="4" name="Title 3"/>
+          <p:cNvSpPr>
+            <a:spLocks noGrp="1"/>
+          </p:cNvSpPr>
+          <p:nvPr>
+            <p:ph type="ctrTitle"/>
+          </p:nvPr>
+        </p:nvSpPr>
+        <p:spPr>
+          <a:xfrm>
+            <a:off x="0" y="3096000"/>
+            <a:ext cx="43200638" cy="6410897"/>
+          </a:xfrm>
+        </p:spPr>
+        <p:txBody>
+          <a:bodyPr lIns="1800000" tIns="1800000" rIns="1800000">
+            <a:noAutofit/>
+          </a:bodyPr>
+          <a:lstStyle/>
+          <a:p>
+            <a:r>
               <a:rPr lang="en-GB" sz="30000" dirty="0" err="1">
                 <a:solidFill>
                   <a:schemeClr val="bg1"/>
@@ -3373,7 +3515,7 @@
 </p:sld>
 </file>
 
-<file path=ppt/slides/slide4.xml><?xml version="1.0" encoding="utf-8"?>
+<file path=ppt/slides/slide5.xml><?xml version="1.0" encoding="utf-8"?>
 <p:sld xmlns:a="http://schemas.openxmlformats.org/drawingml/2006/main" xmlns:r="http://schemas.openxmlformats.org/officeDocument/2006/relationships" xmlns:p="http://schemas.openxmlformats.org/presentationml/2006/main">
   <p:cSld>
     <p:bg>

</xml_diff>